<commit_message>
moved equipment/network ppt to same directory
</commit_message>
<xml_diff>
--- a/docs/EquipmentSetup/RouterSetup.pptx
+++ b/docs/EquipmentSetup/RouterSetup.pptx
@@ -307,7 +307,7 @@
               <a:pPr>
                 <a:defRPr/>
               </a:pPr>
-              <a:t>2022-02-28</a:t>
+              <a:t>2022-03-28</a:t>
             </a:fld>
             <a:endParaRPr lang="fr-CA"/>
           </a:p>
@@ -522,7 +522,7 @@
               <a:pPr>
                 <a:defRPr/>
               </a:pPr>
-              <a:t>2022-02-28</a:t>
+              <a:t>2022-03-28</a:t>
             </a:fld>
             <a:endParaRPr lang="fr-CA"/>
           </a:p>
@@ -747,7 +747,7 @@
               <a:pPr>
                 <a:defRPr/>
               </a:pPr>
-              <a:t>2022-02-28</a:t>
+              <a:t>2022-03-28</a:t>
             </a:fld>
             <a:endParaRPr lang="fr-CA"/>
           </a:p>
@@ -962,7 +962,7 @@
               <a:pPr>
                 <a:defRPr/>
               </a:pPr>
-              <a:t>2022-02-28</a:t>
+              <a:t>2022-03-28</a:t>
             </a:fld>
             <a:endParaRPr lang="fr-CA"/>
           </a:p>
@@ -1253,7 +1253,7 @@
               <a:pPr>
                 <a:defRPr/>
               </a:pPr>
-              <a:t>2022-02-28</a:t>
+              <a:t>2022-03-28</a:t>
             </a:fld>
             <a:endParaRPr lang="fr-CA"/>
           </a:p>
@@ -1530,7 +1530,7 @@
               <a:pPr>
                 <a:defRPr/>
               </a:pPr>
-              <a:t>2022-02-28</a:t>
+              <a:t>2022-03-28</a:t>
             </a:fld>
             <a:endParaRPr lang="fr-CA"/>
           </a:p>
@@ -1942,7 +1942,7 @@
               <a:pPr>
                 <a:defRPr/>
               </a:pPr>
-              <a:t>2022-02-28</a:t>
+              <a:t>2022-03-28</a:t>
             </a:fld>
             <a:endParaRPr lang="fr-CA"/>
           </a:p>
@@ -2105,7 +2105,7 @@
               <a:pPr>
                 <a:defRPr/>
               </a:pPr>
-              <a:t>2022-02-28</a:t>
+              <a:t>2022-03-28</a:t>
             </a:fld>
             <a:endParaRPr lang="fr-CA"/>
           </a:p>
@@ -2245,7 +2245,7 @@
               <a:pPr>
                 <a:defRPr/>
               </a:pPr>
-              <a:t>2022-02-28</a:t>
+              <a:t>2022-03-28</a:t>
             </a:fld>
             <a:endParaRPr lang="fr-CA"/>
           </a:p>
@@ -2567,7 +2567,7 @@
               <a:pPr>
                 <a:defRPr/>
               </a:pPr>
-              <a:t>2022-02-28</a:t>
+              <a:t>2022-03-28</a:t>
             </a:fld>
             <a:endParaRPr lang="fr-CA"/>
           </a:p>
@@ -2868,7 +2868,7 @@
               <a:pPr>
                 <a:defRPr/>
               </a:pPr>
-              <a:t>2022-02-28</a:t>
+              <a:t>2022-03-28</a:t>
             </a:fld>
             <a:endParaRPr lang="fr-CA"/>
           </a:p>
@@ -3195,7 +3195,7 @@
               <a:pPr>
                 <a:defRPr/>
               </a:pPr>
-              <a:t>2022-02-28</a:t>
+              <a:t>2022-03-28</a:t>
             </a:fld>
             <a:endParaRPr lang="fr-CA"/>
           </a:p>
@@ -18965,7 +18965,7 @@
           <a:lstStyle/>
           <a:p>
             <a:pPr algn="ctr"/>
-            <a:endParaRPr lang="en-CA" dirty="0"/>
+            <a:endParaRPr lang="fr-CA" dirty="0"/>
           </a:p>
         </p:txBody>
       </p:sp>
@@ -19011,7 +19011,7 @@
           <a:lstStyle/>
           <a:p>
             <a:pPr algn="ctr"/>
-            <a:endParaRPr lang="en-CA" dirty="0"/>
+            <a:endParaRPr lang="fr-CA" dirty="0"/>
           </a:p>
         </p:txBody>
       </p:sp>
@@ -19057,7 +19057,7 @@
           <a:lstStyle/>
           <a:p>
             <a:pPr algn="ctr"/>
-            <a:endParaRPr lang="en-CA" dirty="0"/>
+            <a:endParaRPr lang="fr-CA" dirty="0"/>
           </a:p>
         </p:txBody>
       </p:sp>
@@ -19103,7 +19103,7 @@
           <a:lstStyle/>
           <a:p>
             <a:pPr algn="ctr"/>
-            <a:endParaRPr lang="en-CA" dirty="0"/>
+            <a:endParaRPr lang="fr-CA" dirty="0"/>
           </a:p>
         </p:txBody>
       </p:sp>
@@ -19149,7 +19149,7 @@
           <a:lstStyle/>
           <a:p>
             <a:pPr algn="ctr"/>
-            <a:endParaRPr lang="en-CA" dirty="0"/>
+            <a:endParaRPr lang="fr-CA" dirty="0"/>
           </a:p>
         </p:txBody>
       </p:sp>
@@ -19201,7 +19201,7 @@
           <a:lstStyle/>
           <a:p>
             <a:pPr algn="ctr"/>
-            <a:endParaRPr lang="en-CA" dirty="0"/>
+            <a:endParaRPr lang="fr-CA" dirty="0"/>
           </a:p>
         </p:txBody>
       </p:sp>
@@ -19253,7 +19253,7 @@
           <a:lstStyle/>
           <a:p>
             <a:pPr algn="ctr"/>
-            <a:endParaRPr lang="en-CA" dirty="0"/>
+            <a:endParaRPr lang="fr-CA" dirty="0"/>
           </a:p>
         </p:txBody>
       </p:sp>
@@ -19365,7 +19365,7 @@
             <a:lstStyle/>
             <a:p>
               <a:pPr algn="ctr"/>
-              <a:endParaRPr lang="en-CA" dirty="0"/>
+              <a:endParaRPr lang="fr-CA" dirty="0"/>
             </a:p>
           </p:txBody>
         </p:sp>
@@ -19411,7 +19411,7 @@
             <a:lstStyle/>
             <a:p>
               <a:pPr algn="ctr"/>
-              <a:endParaRPr lang="en-CA" dirty="0"/>
+              <a:endParaRPr lang="fr-CA" dirty="0"/>
             </a:p>
           </p:txBody>
         </p:sp>
@@ -19457,7 +19457,7 @@
             <a:lstStyle/>
             <a:p>
               <a:pPr algn="ctr"/>
-              <a:endParaRPr lang="en-CA" dirty="0"/>
+              <a:endParaRPr lang="fr-CA" dirty="0"/>
             </a:p>
           </p:txBody>
         </p:sp>
@@ -19503,7 +19503,7 @@
             <a:lstStyle/>
             <a:p>
               <a:pPr algn="ctr"/>
-              <a:endParaRPr lang="en-CA" dirty="0"/>
+              <a:endParaRPr lang="fr-CA" dirty="0"/>
             </a:p>
           </p:txBody>
         </p:sp>
@@ -19549,7 +19549,7 @@
             <a:lstStyle/>
             <a:p>
               <a:pPr algn="ctr"/>
-              <a:endParaRPr lang="en-CA" dirty="0"/>
+              <a:endParaRPr lang="fr-CA" dirty="0"/>
             </a:p>
           </p:txBody>
         </p:sp>
@@ -19599,53 +19599,10 @@
           <a:lstStyle/>
           <a:p>
             <a:pPr algn="ctr"/>
-            <a:endParaRPr lang="en-CA" dirty="0"/>
-          </a:p>
-        </p:txBody>
-      </p:sp>
-      <p:cxnSp>
-        <p:nvCxnSpPr>
-          <p:cNvPr id="88" name="Straight Arrow Connector 87">
-            <a:extLst>
-              <a:ext uri="{FF2B5EF4-FFF2-40B4-BE49-F238E27FC236}">
-                <a16:creationId xmlns:a16="http://schemas.microsoft.com/office/drawing/2014/main" id="{E8D38BCD-6C5A-440C-85F3-EC475A271956}"/>
-              </a:ext>
-            </a:extLst>
-          </p:cNvPr>
-          <p:cNvCxnSpPr>
-            <a:cxnSpLocks/>
-            <a:stCxn id="35" idx="0"/>
-            <a:endCxn id="86" idx="1"/>
-          </p:cNvCxnSpPr>
-          <p:nvPr/>
-        </p:nvCxnSpPr>
-        <p:spPr>
-          <a:xfrm flipH="1" flipV="1">
-            <a:off x="10158380" y="1719028"/>
-            <a:ext cx="48" cy="378954"/>
-          </a:xfrm>
-          <a:prstGeom prst="straightConnector1">
-            <a:avLst/>
-          </a:prstGeom>
-          <a:ln>
-            <a:tailEnd type="triangle"/>
-          </a:ln>
-        </p:spPr>
-        <p:style>
-          <a:lnRef idx="1">
-            <a:schemeClr val="accent1"/>
-          </a:lnRef>
-          <a:fillRef idx="0">
-            <a:schemeClr val="accent1"/>
-          </a:fillRef>
-          <a:effectRef idx="0">
-            <a:schemeClr val="accent1"/>
-          </a:effectRef>
-          <a:fontRef idx="minor">
-            <a:schemeClr val="tx1"/>
-          </a:fontRef>
-        </p:style>
-      </p:cxnSp>
+            <a:endParaRPr lang="fr-CA" dirty="0"/>
+          </a:p>
+        </p:txBody>
+      </p:sp>
       <p:sp>
         <p:nvSpPr>
           <p:cNvPr id="92" name="TextBox 91">
@@ -19661,7 +19618,7 @@
         <p:spPr>
           <a:xfrm>
             <a:off x="9656478" y="2207145"/>
-            <a:ext cx="1003801" cy="246221"/>
+            <a:ext cx="184731" cy="246221"/>
           </a:xfrm>
           <a:prstGeom prst="rect">
             <a:avLst/>
@@ -19674,13 +19631,7 @@
           </a:bodyPr>
           <a:lstStyle/>
           <a:p>
-            <a:r>
-              <a:rPr lang="en-CA" sz="1000" dirty="0">
-                <a:effectLst/>
-              </a:rPr>
-              <a:t>107.171.217.85</a:t>
-            </a:r>
-            <a:endParaRPr lang="en-CA" sz="1000" dirty="0"/>
+            <a:endParaRPr lang="fr-CA" sz="1000" dirty="0"/>
           </a:p>
         </p:txBody>
       </p:sp>
@@ -19698,8 +19649,8 @@
         </p:nvSpPr>
         <p:spPr>
           <a:xfrm>
-            <a:off x="9313589" y="2514526"/>
-            <a:ext cx="609462" cy="246221"/>
+            <a:off x="9243524" y="2514526"/>
+            <a:ext cx="740908" cy="246221"/>
           </a:xfrm>
           <a:prstGeom prst="rect">
             <a:avLst/>
@@ -19713,12 +19664,12 @@
           <a:lstStyle/>
           <a:p>
             <a:r>
-              <a:rPr lang="en-CA" sz="1000" dirty="0">
+              <a:rPr lang="fr-CA" sz="1000" dirty="0">
                 <a:effectLst/>
               </a:rPr>
-              <a:t>10.0.0.1</a:t>
-            </a:r>
-            <a:endParaRPr lang="en-CA" sz="1000" dirty="0"/>
+              <a:t>10.0.0.232</a:t>
+            </a:r>
+            <a:endParaRPr lang="fr-CA" sz="1000" dirty="0"/>
           </a:p>
         </p:txBody>
       </p:sp>
@@ -19790,7 +19741,7 @@
             <a:lstStyle/>
             <a:p>
               <a:pPr algn="ctr"/>
-              <a:endParaRPr lang="en-CA" dirty="0"/>
+              <a:endParaRPr lang="fr-CA" dirty="0"/>
             </a:p>
           </p:txBody>
         </p:sp>
@@ -19848,8 +19799,8 @@
         </p:nvSpPr>
         <p:spPr>
           <a:xfrm>
-            <a:off x="8256302" y="1803887"/>
-            <a:ext cx="1312667" cy="307777"/>
+            <a:off x="8966823" y="1703274"/>
+            <a:ext cx="1074461" cy="523220"/>
           </a:xfrm>
           <a:prstGeom prst="rect">
             <a:avLst/>
@@ -19863,8 +19814,15 @@
           <a:lstStyle/>
           <a:p>
             <a:r>
-              <a:rPr lang="en-CA" sz="1400" dirty="0"/>
-              <a:t>Internet Router</a:t>
+              <a:rPr lang="fr-CA" sz="1400" dirty="0"/>
+              <a:t>Bridge Wi-Fi</a:t>
+            </a:r>
+            <a:br>
+              <a:rPr lang="fr-CA" sz="1400" dirty="0"/>
+            </a:br>
+            <a:r>
+              <a:rPr lang="fr-CA" sz="1400" dirty="0"/>
+              <a:t>(Routeur B)</a:t>
             </a:r>
           </a:p>
         </p:txBody>
@@ -19944,9 +19902,9 @@
         <p:grpSpPr>
           <a:xfrm>
             <a:off x="5331622" y="4018421"/>
-            <a:ext cx="1234632" cy="850739"/>
+            <a:ext cx="1234633" cy="850739"/>
             <a:chOff x="5932259" y="3738627"/>
-            <a:chExt cx="1234632" cy="850739"/>
+            <a:chExt cx="1234633" cy="850739"/>
           </a:xfrm>
         </p:grpSpPr>
         <p:pic>
@@ -20031,7 +19989,7 @@
           <p:spPr>
             <a:xfrm>
               <a:off x="5932259" y="4035368"/>
-              <a:ext cx="1234632" cy="553998"/>
+              <a:ext cx="1234633" cy="553998"/>
             </a:xfrm>
             <a:prstGeom prst="rect">
               <a:avLst/>
@@ -20046,34 +20004,34 @@
             <a:p>
               <a:pPr algn="ctr"/>
               <a:r>
-                <a:rPr lang="en-CA" sz="1000" dirty="0">
+                <a:rPr lang="fr-CA" sz="1000" dirty="0">
                   <a:effectLst/>
                 </a:rPr>
                 <a:t>Owlcms</a:t>
               </a:r>
               <a:br>
-                <a:rPr lang="en-CA" sz="1000" dirty="0">
+                <a:rPr lang="fr-CA" sz="1000" dirty="0">
                   <a:effectLst/>
                 </a:rPr>
               </a:br>
               <a:r>
-                <a:rPr lang="en-CA" sz="1000" dirty="0">
+                <a:rPr lang="fr-CA" sz="1000" dirty="0">
                   <a:effectLst/>
                 </a:rPr>
-                <a:t>DHCP Reservation</a:t>
+                <a:t>DHCP Réservation</a:t>
               </a:r>
               <a:br>
-                <a:rPr lang="en-CA" sz="1000" dirty="0">
+                <a:rPr lang="fr-CA" sz="1000" dirty="0">
                   <a:effectLst/>
                 </a:rPr>
               </a:br>
               <a:r>
-                <a:rPr lang="en-CA" sz="1000" dirty="0">
+                <a:rPr lang="fr-CA" sz="1000" dirty="0">
                   <a:effectLst/>
                 </a:rPr>
-                <a:t>192.168.0.100:8080</a:t>
+                <a:t>192.168.0.139:8080</a:t>
               </a:r>
-              <a:endParaRPr lang="en-CA" sz="1000" dirty="0"/>
+              <a:endParaRPr lang="fr-CA" sz="1000" dirty="0"/>
             </a:p>
           </p:txBody>
         </p:sp>
@@ -20108,12 +20066,12 @@
           <a:p>
             <a:pPr algn="ctr"/>
             <a:r>
-              <a:rPr lang="en-CA" sz="1000" dirty="0">
+              <a:rPr lang="fr-CA" sz="1000" dirty="0">
                 <a:effectLst/>
               </a:rPr>
               <a:t>OBS</a:t>
             </a:r>
-            <a:endParaRPr lang="en-CA" sz="1000" dirty="0"/>
+            <a:endParaRPr lang="fr-CA" sz="1000" dirty="0"/>
           </a:p>
         </p:txBody>
       </p:sp>
@@ -20179,7 +20137,7 @@
             <a:lstStyle/>
             <a:p>
               <a:pPr algn="ctr"/>
-              <a:endParaRPr lang="en-CA" dirty="0"/>
+              <a:endParaRPr lang="fr-CA" dirty="0"/>
             </a:p>
           </p:txBody>
         </p:sp>
@@ -20225,7 +20183,7 @@
             <a:lstStyle/>
             <a:p>
               <a:pPr algn="ctr"/>
-              <a:endParaRPr lang="en-CA" dirty="0"/>
+              <a:endParaRPr lang="fr-CA" dirty="0"/>
             </a:p>
           </p:txBody>
         </p:sp>
@@ -20271,7 +20229,7 @@
             <a:lstStyle/>
             <a:p>
               <a:pPr algn="ctr"/>
-              <a:endParaRPr lang="en-CA" dirty="0"/>
+              <a:endParaRPr lang="fr-CA" dirty="0"/>
             </a:p>
           </p:txBody>
         </p:sp>
@@ -20317,7 +20275,7 @@
             <a:lstStyle/>
             <a:p>
               <a:pPr algn="ctr"/>
-              <a:endParaRPr lang="en-CA" dirty="0"/>
+              <a:endParaRPr lang="fr-CA" dirty="0"/>
             </a:p>
           </p:txBody>
         </p:sp>
@@ -20363,7 +20321,7 @@
             <a:lstStyle/>
             <a:p>
               <a:pPr algn="ctr"/>
-              <a:endParaRPr lang="en-CA" dirty="0"/>
+              <a:endParaRPr lang="fr-CA" dirty="0"/>
             </a:p>
           </p:txBody>
         </p:sp>
@@ -20415,7 +20373,7 @@
             <a:lstStyle/>
             <a:p>
               <a:pPr algn="ctr"/>
-              <a:endParaRPr lang="en-CA" dirty="0"/>
+              <a:endParaRPr lang="fr-CA" dirty="0"/>
             </a:p>
           </p:txBody>
         </p:sp>
@@ -20467,7 +20425,7 @@
             <a:lstStyle/>
             <a:p>
               <a:pPr algn="ctr"/>
-              <a:endParaRPr lang="en-CA" dirty="0"/>
+              <a:endParaRPr lang="fr-CA" dirty="0"/>
             </a:p>
           </p:txBody>
         </p:sp>
@@ -20500,12 +20458,12 @@
             <a:lstStyle/>
             <a:p>
               <a:r>
-                <a:rPr lang="en-CA" sz="1000" dirty="0">
+                <a:rPr lang="fr-CA" sz="1000" dirty="0">
                   <a:effectLst/>
                 </a:rPr>
-                <a:t>10.0.0.234</a:t>
+                <a:t>10.0.0.120</a:t>
               </a:r>
-              <a:endParaRPr lang="en-CA" sz="1000" dirty="0"/>
+              <a:endParaRPr lang="fr-CA" sz="1000" dirty="0"/>
             </a:p>
           </p:txBody>
         </p:sp>
@@ -20538,12 +20496,12 @@
             <a:lstStyle/>
             <a:p>
               <a:r>
-                <a:rPr lang="en-CA" sz="1000" dirty="0">
+                <a:rPr lang="fr-CA" sz="1000" dirty="0">
                   <a:effectLst/>
                 </a:rPr>
                 <a:t>192.168.0.1</a:t>
               </a:r>
-              <a:endParaRPr lang="en-CA" sz="1000" dirty="0"/>
+              <a:endParaRPr lang="fr-CA" sz="1000" dirty="0"/>
             </a:p>
           </p:txBody>
         </p:sp>
@@ -20615,7 +20573,7 @@
               <a:lstStyle/>
               <a:p>
                 <a:pPr algn="ctr"/>
-                <a:endParaRPr lang="en-CA" dirty="0"/>
+                <a:endParaRPr lang="fr-CA" dirty="0"/>
               </a:p>
             </p:txBody>
           </p:sp>
@@ -20689,55 +20647,16 @@
             <a:p>
               <a:pPr algn="ctr"/>
               <a:r>
-                <a:rPr lang="en-CA" sz="1000" dirty="0">
+                <a:rPr lang="fr-CA" sz="1000" dirty="0">
                   <a:effectLst/>
                 </a:rPr>
                 <a:t>WAN</a:t>
               </a:r>
-              <a:endParaRPr lang="en-CA" sz="1000" dirty="0"/>
+              <a:endParaRPr lang="fr-CA" sz="1000" dirty="0"/>
             </a:p>
           </p:txBody>
         </p:sp>
       </p:grpSp>
-      <p:sp>
-        <p:nvSpPr>
-          <p:cNvPr id="118" name="TextBox 117">
-            <a:extLst>
-              <a:ext uri="{FF2B5EF4-FFF2-40B4-BE49-F238E27FC236}">
-                <a16:creationId xmlns:a16="http://schemas.microsoft.com/office/drawing/2014/main" id="{4048DE45-7D70-4F25-BBC2-6410E7FA64E1}"/>
-              </a:ext>
-            </a:extLst>
-          </p:cNvPr>
-          <p:cNvSpPr txBox="1"/>
-          <p:nvPr/>
-        </p:nvSpPr>
-        <p:spPr>
-          <a:xfrm>
-            <a:off x="9670605" y="1948375"/>
-            <a:ext cx="455574" cy="246221"/>
-          </a:xfrm>
-          <a:prstGeom prst="rect">
-            <a:avLst/>
-          </a:prstGeom>
-          <a:noFill/>
-        </p:spPr>
-        <p:txBody>
-          <a:bodyPr wrap="none" rtlCol="0">
-            <a:spAutoFit/>
-          </a:bodyPr>
-          <a:lstStyle/>
-          <a:p>
-            <a:pPr algn="ctr"/>
-            <a:r>
-              <a:rPr lang="en-CA" sz="1000" dirty="0">
-                <a:effectLst/>
-              </a:rPr>
-              <a:t>WAN</a:t>
-            </a:r>
-            <a:endParaRPr lang="en-CA" sz="1000" dirty="0"/>
-          </a:p>
-        </p:txBody>
-      </p:sp>
       <p:cxnSp>
         <p:nvCxnSpPr>
           <p:cNvPr id="120" name="Straight Arrow Connector 119">
@@ -20795,8 +20714,8 @@
         </p:nvSpPr>
         <p:spPr>
           <a:xfrm>
-            <a:off x="7323735" y="3577131"/>
-            <a:ext cx="1574470" cy="400110"/>
+            <a:off x="6069224" y="3561075"/>
+            <a:ext cx="1234633" cy="553998"/>
           </a:xfrm>
           <a:prstGeom prst="rect">
             <a:avLst/>
@@ -20811,26 +20730,34 @@
           <a:p>
             <a:pPr algn="ctr"/>
             <a:r>
-              <a:rPr lang="en-CA" sz="1000" dirty="0">
+              <a:rPr lang="fr-CA" sz="1000" dirty="0">
                 <a:effectLst/>
               </a:rPr>
-              <a:t>10.0.0.234:8080</a:t>
+              <a:t>Port externe 8080</a:t>
             </a:r>
             <a:br>
-              <a:rPr lang="en-CA" sz="1000" dirty="0">
+              <a:rPr lang="fr-CA" sz="1000" dirty="0">
                 <a:effectLst/>
               </a:rPr>
             </a:br>
             <a:r>
-              <a:rPr lang="en-CA" sz="1000" dirty="0">
+              <a:rPr lang="fr-CA" sz="1000" dirty="0">
                 <a:effectLst/>
               </a:rPr>
-              <a:t>port redirection</a:t>
-            </a:r>
-            <a:r>
-              <a:rPr lang="en-CA" sz="1000" dirty="0"/>
-              <a:t> to owlcms</a:t>
-            </a:r>
+              <a:t>redirection vers</a:t>
+            </a:r>
+            <a:br>
+              <a:rPr lang="fr-CA" sz="1000" dirty="0">
+                <a:effectLst/>
+              </a:rPr>
+            </a:br>
+            <a:r>
+              <a:rPr lang="fr-CA" sz="1000" dirty="0">
+                <a:effectLst/>
+              </a:rPr>
+              <a:t>192.168.0.139:8080</a:t>
+            </a:r>
+            <a:endParaRPr lang="fr-CA" sz="1000" dirty="0"/>
           </a:p>
         </p:txBody>
       </p:sp>
@@ -20848,8 +20775,8 @@
         </p:nvSpPr>
         <p:spPr>
           <a:xfrm>
-            <a:off x="4872904" y="2300312"/>
-            <a:ext cx="1095813" cy="523220"/>
+            <a:off x="2756644" y="2021236"/>
+            <a:ext cx="918072" cy="307777"/>
           </a:xfrm>
           <a:prstGeom prst="rect">
             <a:avLst/>
@@ -20863,15 +20790,8 @@
           <a:lstStyle/>
           <a:p>
             <a:r>
-              <a:rPr lang="en-CA" sz="1400" dirty="0"/>
-              <a:t>Competition</a:t>
-            </a:r>
-            <a:br>
-              <a:rPr lang="en-CA" sz="1400" dirty="0"/>
-            </a:br>
-            <a:r>
-              <a:rPr lang="en-CA" sz="1400" dirty="0"/>
-              <a:t>Router</a:t>
+              <a:rPr lang="fr-CA" sz="1400" dirty="0"/>
+              <a:t>Routeur A</a:t>
             </a:r>
           </a:p>
         </p:txBody>
@@ -20894,16 +20814,16 @@
         </p:nvCxnSpPr>
         <p:spPr>
           <a:xfrm rot="5400000" flipH="1" flipV="1">
-            <a:off x="6701469" y="705637"/>
-            <a:ext cx="3410991" cy="4916055"/>
+            <a:off x="6701470" y="705638"/>
+            <a:ext cx="3410991" cy="4916054"/>
           </a:xfrm>
           <a:prstGeom prst="bentConnector4">
             <a:avLst>
               <a:gd name="adj1" fmla="val -6702"/>
-              <a:gd name="adj2" fmla="val 106741"/>
+              <a:gd name="adj2" fmla="val 104674"/>
             </a:avLst>
           </a:prstGeom>
-          <a:ln w="44450">
+          <a:ln w="12700">
             <a:solidFill>
               <a:schemeClr val="accent6"/>
             </a:solidFill>
@@ -20989,7 +20909,7 @@
         </p:nvSpPr>
         <p:spPr>
           <a:xfrm>
-            <a:off x="10146944" y="4564632"/>
+            <a:off x="9972521" y="4614165"/>
             <a:ext cx="846707" cy="400110"/>
           </a:xfrm>
           <a:prstGeom prst="rect">
@@ -21005,23 +20925,23 @@
           <a:p>
             <a:pPr algn="ctr"/>
             <a:r>
-              <a:rPr lang="en-CA" sz="1000" dirty="0">
+              <a:rPr lang="fr-CA" sz="1000" dirty="0">
                 <a:effectLst/>
               </a:rPr>
               <a:t>Heroku</a:t>
             </a:r>
             <a:br>
-              <a:rPr lang="en-CA" sz="1000" dirty="0">
+              <a:rPr lang="fr-CA" sz="1000" dirty="0">
                 <a:effectLst/>
               </a:rPr>
             </a:br>
             <a:r>
-              <a:rPr lang="en-CA" sz="1000" dirty="0">
+              <a:rPr lang="fr-CA" sz="1000" dirty="0" err="1">
                 <a:effectLst/>
               </a:rPr>
               <a:t>publicresults</a:t>
             </a:r>
-            <a:endParaRPr lang="en-CA" sz="1000" dirty="0"/>
+            <a:endParaRPr lang="fr-CA" sz="1000" dirty="0"/>
           </a:p>
         </p:txBody>
       </p:sp>
@@ -21055,34 +20975,34 @@
           <a:p>
             <a:pPr algn="ctr"/>
             <a:r>
-              <a:rPr lang="en-CA" sz="1000" dirty="0">
+              <a:rPr lang="fr-CA" sz="1000" dirty="0">
                 <a:effectLst/>
               </a:rPr>
               <a:t>YouTube</a:t>
             </a:r>
             <a:br>
-              <a:rPr lang="en-CA" sz="1000" dirty="0">
+              <a:rPr lang="fr-CA" sz="1000" dirty="0">
                 <a:effectLst/>
               </a:rPr>
             </a:br>
             <a:r>
-              <a:rPr lang="en-CA" sz="1000" dirty="0">
+              <a:rPr lang="fr-CA" sz="1000" dirty="0">
                 <a:effectLst/>
               </a:rPr>
               <a:t>Facebook</a:t>
             </a:r>
             <a:br>
-              <a:rPr lang="en-CA" sz="1000" dirty="0">
+              <a:rPr lang="fr-CA" sz="1000" dirty="0">
                 <a:effectLst/>
               </a:rPr>
             </a:br>
             <a:r>
-              <a:rPr lang="en-CA" sz="1000" dirty="0">
+              <a:rPr lang="fr-CA" sz="1000" dirty="0">
                 <a:effectLst/>
               </a:rPr>
               <a:t>streaming</a:t>
             </a:r>
-            <a:endParaRPr lang="en-CA" sz="1000" dirty="0"/>
+            <a:endParaRPr lang="fr-CA" sz="1000" dirty="0"/>
           </a:p>
         </p:txBody>
       </p:sp>
@@ -21129,7 +21049,7 @@
           <a:lstStyle/>
           <a:p>
             <a:pPr algn="ctr"/>
-            <a:endParaRPr lang="en-CA" dirty="0"/>
+            <a:endParaRPr lang="fr-CA" dirty="0"/>
           </a:p>
         </p:txBody>
       </p:sp>
@@ -21147,8 +21067,8 @@
         </p:nvSpPr>
         <p:spPr>
           <a:xfrm>
-            <a:off x="767408" y="283774"/>
-            <a:ext cx="5803551" cy="861774"/>
+            <a:off x="767408" y="63175"/>
+            <a:ext cx="5803551" cy="1046440"/>
           </a:xfrm>
           <a:prstGeom prst="rect">
             <a:avLst/>
@@ -21162,8 +21082,8 @@
           <a:lstStyle/>
           <a:p>
             <a:r>
-              <a:rPr lang="en-CA" sz="1400" dirty="0"/>
-              <a:t>Competition Network</a:t>
+              <a:rPr lang="fr-CA" sz="1400" dirty="0"/>
+              <a:t>Réseau de compétition</a:t>
             </a:r>
           </a:p>
           <a:p>
@@ -21172,8 +21092,8 @@
               <a:buChar char="•"/>
             </a:pPr>
             <a:r>
-              <a:rPr lang="en-CA" sz="1200" dirty="0"/>
-              <a:t>All machines see owlcms using its 192.168 address</a:t>
+              <a:rPr lang="fr-CA" sz="1200" dirty="0"/>
+              <a:t>Même configuration et adresses réseau que normalement</a:t>
             </a:r>
           </a:p>
           <a:p>
@@ -21182,16 +21102,16 @@
               <a:buChar char="•"/>
             </a:pPr>
             <a:r>
-              <a:rPr lang="en-CA" sz="1200" dirty="0"/>
-              <a:t>One switch per platform (PoE is used to provide power to </a:t>
-            </a:r>
-            <a:r>
-              <a:rPr lang="en-CA" sz="1200" dirty="0" err="1"/>
+              <a:rPr lang="fr-CA" sz="1200" dirty="0"/>
+              <a:t>Toutes les antennes </a:t>
+            </a:r>
+            <a:r>
+              <a:rPr lang="fr-CA" sz="1200" dirty="0" err="1"/>
               <a:t>WiFi</a:t>
             </a:r>
             <a:r>
-              <a:rPr lang="en-CA" sz="1200" dirty="0"/>
-              <a:t> access points)</a:t>
+              <a:rPr lang="fr-CA" sz="1200" dirty="0"/>
+              <a:t> vont dans les ports PoE</a:t>
             </a:r>
           </a:p>
           <a:p>
@@ -21200,8 +21120,18 @@
               <a:buChar char="•"/>
             </a:pPr>
             <a:r>
-              <a:rPr lang="en-CA" sz="1200" dirty="0"/>
-              <a:t>Competition traffic is completely within the switch(es)</a:t>
+              <a:rPr lang="fr-CA" sz="1200" dirty="0"/>
+              <a:t>Tous les appareils câblés vont dans les commutateurs (switch)</a:t>
+            </a:r>
+          </a:p>
+          <a:p>
+            <a:pPr marL="285750" indent="-285750">
+              <a:buFont typeface="Arial" panose="020B0604020202020204" pitchFamily="34" charset="0"/>
+              <a:buChar char="•"/>
+            </a:pPr>
+            <a:r>
+              <a:rPr lang="fr-CA" sz="1200" dirty="0"/>
+              <a:t>Configuration du routeur (« redirection ») pour permettre l’accès à partir de OBS</a:t>
             </a:r>
           </a:p>
         </p:txBody>
@@ -21294,7 +21224,7 @@
               <a:lstStyle/>
               <a:p>
                 <a:pPr algn="ctr"/>
-                <a:endParaRPr lang="en-CA" dirty="0"/>
+                <a:endParaRPr lang="fr-CA" dirty="0"/>
               </a:p>
             </p:txBody>
           </p:sp>
@@ -21368,11 +21298,11 @@
             <a:p>
               <a:pPr algn="ctr"/>
               <a:r>
-                <a:rPr lang="en-CA" sz="1000" dirty="0" err="1"/>
+                <a:rPr lang="fr-CA" sz="1000" dirty="0" err="1"/>
                 <a:t>WiFi</a:t>
               </a:r>
               <a:r>
-                <a:rPr lang="en-CA" sz="1000" dirty="0"/>
+                <a:rPr lang="fr-CA" sz="1000" dirty="0"/>
                 <a:t> Access Point</a:t>
               </a:r>
             </a:p>
@@ -21435,7 +21365,7 @@
         <p:spPr>
           <a:xfrm>
             <a:off x="9419327" y="5634771"/>
-            <a:ext cx="1749197" cy="261610"/>
+            <a:ext cx="1745991" cy="261610"/>
           </a:xfrm>
           <a:prstGeom prst="rect">
             <a:avLst/>
@@ -21449,8 +21379,16 @@
           <a:lstStyle/>
           <a:p>
             <a:r>
-              <a:rPr lang="en-CA" sz="1100" dirty="0"/>
-              <a:t>Physical or WIFI connection</a:t>
+              <a:rPr lang="fr-CA" sz="1100" dirty="0"/>
+              <a:t>Connexion </a:t>
+            </a:r>
+            <a:r>
+              <a:rPr lang="fr-CA" sz="1100" dirty="0" err="1"/>
+              <a:t>ethernet</a:t>
+            </a:r>
+            <a:r>
+              <a:rPr lang="fr-CA" sz="1100" dirty="0"/>
+              <a:t> ou wifi</a:t>
             </a:r>
           </a:p>
         </p:txBody>
@@ -21543,7 +21481,7 @@
           <a:lstStyle/>
           <a:p>
             <a:pPr algn="ctr"/>
-            <a:endParaRPr lang="en-CA" dirty="0"/>
+            <a:endParaRPr lang="fr-CA" dirty="0"/>
           </a:p>
         </p:txBody>
       </p:sp>
@@ -21561,8 +21499,8 @@
         </p:nvSpPr>
         <p:spPr>
           <a:xfrm>
-            <a:off x="7462583" y="523911"/>
-            <a:ext cx="4003405" cy="677108"/>
+            <a:off x="7515140" y="99062"/>
+            <a:ext cx="4003405" cy="1046440"/>
           </a:xfrm>
           <a:prstGeom prst="rect">
             <a:avLst/>
@@ -21576,8 +21514,8 @@
           <a:lstStyle/>
           <a:p>
             <a:r>
-              <a:rPr lang="en-CA" sz="1400" dirty="0"/>
-              <a:t>Isolated Video Network</a:t>
+              <a:rPr lang="fr-CA" sz="1400" dirty="0"/>
+              <a:t>Réseau pour transmission vidéo</a:t>
             </a:r>
           </a:p>
           <a:p>
@@ -21586,8 +21524,8 @@
               <a:buChar char="•"/>
             </a:pPr>
             <a:r>
-              <a:rPr lang="en-CA" sz="1200" dirty="0"/>
-              <a:t>Needs a redirection to see owlcms</a:t>
+              <a:rPr lang="fr-CA" sz="1200" dirty="0"/>
+              <a:t>Logiciel OBS pour superposer vidéo et données de compétition (athlète courant, poids demandé, etc.)</a:t>
             </a:r>
           </a:p>
           <a:p>
@@ -21596,8 +21534,26 @@
               <a:buChar char="•"/>
             </a:pPr>
             <a:r>
-              <a:rPr lang="en-CA" sz="1200" dirty="0"/>
-              <a:t>Avoids video traffic hitting the competition router</a:t>
+              <a:rPr lang="fr-CA" sz="1200" dirty="0"/>
+              <a:t>Pont </a:t>
+            </a:r>
+            <a:r>
+              <a:rPr lang="fr-CA" sz="1200" dirty="0" err="1"/>
+              <a:t>WiFi</a:t>
+            </a:r>
+            <a:r>
+              <a:rPr lang="fr-CA" sz="1200" dirty="0"/>
+              <a:t> pour se brancher au réseau</a:t>
+            </a:r>
+          </a:p>
+          <a:p>
+            <a:pPr marL="285750" indent="-285750">
+              <a:buFont typeface="Arial" panose="020B0604020202020204" pitchFamily="34" charset="0"/>
+              <a:buChar char="•"/>
+            </a:pPr>
+            <a:r>
+              <a:rPr lang="fr-CA" sz="1200" dirty="0"/>
+              <a:t>Permet aussi de publier les résultats sur le cloud</a:t>
             </a:r>
           </a:p>
         </p:txBody>
@@ -21617,7 +21573,7 @@
         <p:spPr>
           <a:xfrm>
             <a:off x="9419326" y="5840127"/>
-            <a:ext cx="976549" cy="261610"/>
+            <a:ext cx="1385316" cy="261610"/>
           </a:xfrm>
           <a:prstGeom prst="rect">
             <a:avLst/>
@@ -21631,8 +21587,8 @@
           <a:lstStyle/>
           <a:p>
             <a:r>
-              <a:rPr lang="en-CA" sz="1100" dirty="0"/>
-              <a:t>IP Connection</a:t>
+              <a:rPr lang="fr-CA" sz="1100" dirty="0"/>
+              <a:t>Connexion logique IP</a:t>
             </a:r>
           </a:p>
         </p:txBody>
@@ -21709,7 +21665,7 @@
         </p:blipFill>
         <p:spPr bwMode="auto">
           <a:xfrm>
-            <a:off x="2589302" y="5115450"/>
+            <a:off x="4391233" y="5110028"/>
             <a:ext cx="457204" cy="457204"/>
           </a:xfrm>
           <a:prstGeom prst="rect">
@@ -21757,7 +21713,7 @@
         </p:nvCxnSpPr>
         <p:spPr>
           <a:xfrm flipH="1">
-            <a:off x="2811155" y="5572654"/>
+            <a:off x="4613086" y="5567232"/>
             <a:ext cx="6749" cy="216648"/>
           </a:xfrm>
           <a:prstGeom prst="straightConnector1">
@@ -21870,7 +21826,7 @@
               <a:lstStyle/>
               <a:p>
                 <a:pPr algn="ctr"/>
-                <a:endParaRPr lang="en-CA" dirty="0"/>
+                <a:endParaRPr lang="fr-CA" dirty="0"/>
               </a:p>
             </p:txBody>
           </p:sp>
@@ -21944,11 +21900,11 @@
             <a:p>
               <a:pPr algn="ctr"/>
               <a:r>
-                <a:rPr lang="en-CA" sz="1000" dirty="0" err="1"/>
+                <a:rPr lang="fr-CA" sz="1000" dirty="0" err="1"/>
                 <a:t>WiFi</a:t>
               </a:r>
               <a:r>
-                <a:rPr lang="en-CA" sz="1000" dirty="0"/>
+                <a:rPr lang="fr-CA" sz="1000" dirty="0"/>
                 <a:t> Access Point</a:t>
               </a:r>
             </a:p>
@@ -21973,8 +21929,8 @@
         </p:nvCxnSpPr>
         <p:spPr>
           <a:xfrm rot="10800000" flipV="1">
-            <a:off x="3944744" y="4592161"/>
-            <a:ext cx="1386879" cy="1166854"/>
+            <a:off x="4115780" y="4592161"/>
+            <a:ext cx="1215842" cy="1168048"/>
           </a:xfrm>
           <a:prstGeom prst="bentConnector2">
             <a:avLst/>
@@ -22012,7 +21968,7 @@
         </p:nvGrpSpPr>
         <p:grpSpPr>
           <a:xfrm flipV="1">
-            <a:off x="2972635" y="5756547"/>
+            <a:off x="3143672" y="5757741"/>
             <a:ext cx="2448272" cy="428769"/>
             <a:chOff x="4780743" y="4587645"/>
             <a:chExt cx="2448272" cy="428769"/>
@@ -22060,7 +22016,7 @@
             <a:lstStyle/>
             <a:p>
               <a:pPr algn="ctr"/>
-              <a:endParaRPr lang="en-CA" dirty="0"/>
+              <a:endParaRPr lang="fr-CA" dirty="0"/>
             </a:p>
           </p:txBody>
         </p:sp>
@@ -22106,7 +22062,7 @@
             <a:lstStyle/>
             <a:p>
               <a:pPr algn="ctr"/>
-              <a:endParaRPr lang="en-CA" dirty="0"/>
+              <a:endParaRPr lang="fr-CA" dirty="0"/>
             </a:p>
           </p:txBody>
         </p:sp>
@@ -22152,7 +22108,7 @@
             <a:lstStyle/>
             <a:p>
               <a:pPr algn="ctr"/>
-              <a:endParaRPr lang="en-CA" dirty="0"/>
+              <a:endParaRPr lang="fr-CA" dirty="0"/>
             </a:p>
           </p:txBody>
         </p:sp>
@@ -22198,7 +22154,7 @@
             <a:lstStyle/>
             <a:p>
               <a:pPr algn="ctr"/>
-              <a:endParaRPr lang="en-CA" dirty="0"/>
+              <a:endParaRPr lang="fr-CA" dirty="0"/>
             </a:p>
           </p:txBody>
         </p:sp>
@@ -22244,7 +22200,7 @@
             <a:lstStyle/>
             <a:p>
               <a:pPr algn="ctr"/>
-              <a:endParaRPr lang="en-CA" dirty="0"/>
+              <a:endParaRPr lang="fr-CA" dirty="0"/>
             </a:p>
           </p:txBody>
         </p:sp>
@@ -22267,8 +22223,8 @@
         </p:nvCxnSpPr>
         <p:spPr>
           <a:xfrm rot="16200000" flipV="1">
-            <a:off x="1786369" y="4102228"/>
-            <a:ext cx="2687587" cy="621051"/>
+            <a:off x="1871290" y="4017307"/>
+            <a:ext cx="2688781" cy="792088"/>
           </a:xfrm>
           <a:prstGeom prst="bentConnector3">
             <a:avLst>
@@ -22365,7 +22321,7 @@
         </p:blipFill>
         <p:spPr bwMode="auto">
           <a:xfrm>
-            <a:off x="1073353" y="3962945"/>
+            <a:off x="1073353" y="3789040"/>
             <a:ext cx="457204" cy="457204"/>
           </a:xfrm>
           <a:prstGeom prst="rect">
@@ -22407,14 +22363,13 @@
           </p:cNvPr>
           <p:cNvCxnSpPr>
             <a:cxnSpLocks/>
-            <a:stCxn id="193" idx="2"/>
           </p:cNvCxnSpPr>
           <p:nvPr/>
         </p:nvCxnSpPr>
         <p:spPr>
-          <a:xfrm flipH="1">
-            <a:off x="1295206" y="4420149"/>
-            <a:ext cx="6749" cy="216648"/>
+          <a:xfrm>
+            <a:off x="1301955" y="4127874"/>
+            <a:ext cx="11437" cy="525562"/>
           </a:xfrm>
           <a:prstGeom prst="straightConnector1">
             <a:avLst/>
@@ -22449,20 +22404,18 @@
           </p:cNvPr>
           <p:cNvCxnSpPr>
             <a:cxnSpLocks/>
-            <a:stCxn id="110" idx="0"/>
+            <a:stCxn id="110" idx="1"/>
             <a:endCxn id="113" idx="0"/>
           </p:cNvCxnSpPr>
           <p:nvPr/>
         </p:nvCxnSpPr>
         <p:spPr>
-          <a:xfrm rot="16200000" flipH="1" flipV="1">
-            <a:off x="7252768" y="2046212"/>
-            <a:ext cx="653358" cy="3291060"/>
-          </a:xfrm>
-          <a:prstGeom prst="bentConnector3">
-            <a:avLst>
-              <a:gd name="adj1" fmla="val 321"/>
-            </a:avLst>
+          <a:xfrm rot="10800000" flipV="1">
+            <a:off x="5933917" y="3593665"/>
+            <a:ext cx="3062458" cy="424756"/>
+          </a:xfrm>
+          <a:prstGeom prst="bentConnector2">
+            <a:avLst/>
           </a:prstGeom>
           <a:ln w="44450">
             <a:solidFill>
@@ -22502,7 +22455,7 @@
         <p:spPr>
           <a:xfrm>
             <a:off x="5749867" y="5837628"/>
-            <a:ext cx="997389" cy="369332"/>
+            <a:ext cx="1261884" cy="369332"/>
           </a:xfrm>
           <a:prstGeom prst="rect">
             <a:avLst/>
@@ -22516,19 +22469,15 @@
           <a:lstStyle/>
           <a:p>
             <a:r>
-              <a:rPr lang="fr-CA" sz="900" dirty="0" err="1"/>
-              <a:t>Additional</a:t>
-            </a:r>
-            <a:r>
               <a:rPr lang="fr-CA" sz="900" dirty="0"/>
-              <a:t> switch</a:t>
+              <a:t>Switch supplémentaire</a:t>
             </a:r>
             <a:br>
               <a:rPr lang="fr-CA" sz="900" dirty="0"/>
             </a:br>
             <a:r>
               <a:rPr lang="fr-CA" sz="900" dirty="0"/>
-              <a:t>for platform 2</a:t>
+              <a:t>pour plateforme 2</a:t>
             </a:r>
           </a:p>
         </p:txBody>
@@ -22550,12 +22499,12 @@
         </p:nvCxnSpPr>
         <p:spPr>
           <a:xfrm rot="16200000" flipV="1">
-            <a:off x="5563871" y="5152936"/>
-            <a:ext cx="73677" cy="1295707"/>
+            <a:off x="5716110" y="5172928"/>
+            <a:ext cx="72483" cy="1256917"/>
           </a:xfrm>
           <a:prstGeom prst="bentConnector3">
             <a:avLst>
-              <a:gd name="adj1" fmla="val 410273"/>
+              <a:gd name="adj1" fmla="val 415384"/>
             </a:avLst>
           </a:prstGeom>
           <a:ln>
@@ -22631,7 +22580,7 @@
         <p:spPr>
           <a:xfrm>
             <a:off x="1387918" y="5876473"/>
-            <a:ext cx="2188420" cy="246221"/>
+            <a:ext cx="2779928" cy="246221"/>
           </a:xfrm>
           <a:prstGeom prst="rect">
             <a:avLst/>
@@ -22645,8 +22594,8 @@
           <a:lstStyle/>
           <a:p>
             <a:r>
-              <a:rPr lang="en-CA" sz="1000" dirty="0"/>
-              <a:t>PoE-capable Switch (one per platform)</a:t>
+              <a:rPr lang="fr-CA" sz="1000" dirty="0"/>
+              <a:t>Commutateur (Switch) Power over Ethernet (PoE)</a:t>
             </a:r>
           </a:p>
         </p:txBody>
@@ -22721,6 +22670,382 @@
           </a:p>
         </p:txBody>
       </p:sp>
+      <p:sp>
+        <p:nvSpPr>
+          <p:cNvPr id="91" name="TextBox 90">
+            <a:extLst>
+              <a:ext uri="{FF2B5EF4-FFF2-40B4-BE49-F238E27FC236}">
+                <a16:creationId xmlns:a16="http://schemas.microsoft.com/office/drawing/2014/main" id="{D49E390C-84F5-42E1-86FD-432439EFA71E}"/>
+              </a:ext>
+            </a:extLst>
+          </p:cNvPr>
+          <p:cNvSpPr txBox="1"/>
+          <p:nvPr/>
+        </p:nvSpPr>
+        <p:spPr>
+          <a:xfrm>
+            <a:off x="8458575" y="1187619"/>
+            <a:ext cx="1045479" cy="307777"/>
+          </a:xfrm>
+          <a:prstGeom prst="rect">
+            <a:avLst/>
+          </a:prstGeom>
+          <a:noFill/>
+        </p:spPr>
+        <p:txBody>
+          <a:bodyPr wrap="none" rtlCol="0">
+            <a:spAutoFit/>
+          </a:bodyPr>
+          <a:lstStyle/>
+          <a:p>
+            <a:r>
+              <a:rPr lang="fr-CA" sz="1400" dirty="0"/>
+              <a:t>Wi-Fi Public</a:t>
+            </a:r>
+          </a:p>
+        </p:txBody>
+      </p:sp>
+      <p:pic>
+        <p:nvPicPr>
+          <p:cNvPr id="97" name="Picture 96">
+            <a:extLst>
+              <a:ext uri="{FF2B5EF4-FFF2-40B4-BE49-F238E27FC236}">
+                <a16:creationId xmlns:a16="http://schemas.microsoft.com/office/drawing/2014/main" id="{969C7C6F-8FFE-45F7-8600-8F5C70A9BB38}"/>
+              </a:ext>
+            </a:extLst>
+          </p:cNvPr>
+          <p:cNvPicPr>
+            <a:picLocks noChangeAspect="1"/>
+          </p:cNvPicPr>
+          <p:nvPr/>
+        </p:nvPicPr>
+        <p:blipFill>
+          <a:blip r:embed="rId2">
+            <a:extLst>
+              <a:ext uri="{28A0092B-C50C-407E-A947-70E740481C1C}">
+                <a14:useLocalDpi xmlns:a14="http://schemas.microsoft.com/office/drawing/2010/main" val="0"/>
+              </a:ext>
+              <a:ext uri="{837473B0-CC2E-450A-ABE3-18F120FF3D39}">
+                <a1611:picAttrSrcUrl xmlns:a1611="http://schemas.microsoft.com/office/drawing/2016/11/main" r:id="rId3"/>
+              </a:ext>
+            </a:extLst>
+          </a:blip>
+          <a:stretch>
+            <a:fillRect/>
+          </a:stretch>
+        </p:blipFill>
+        <p:spPr>
+          <a:xfrm>
+            <a:off x="8825667" y="1528364"/>
+            <a:ext cx="182880" cy="129967"/>
+          </a:xfrm>
+          <a:prstGeom prst="rect">
+            <a:avLst/>
+          </a:prstGeom>
+        </p:spPr>
+      </p:pic>
+      <p:cxnSp>
+        <p:nvCxnSpPr>
+          <p:cNvPr id="6" name="Connector: Elbow 5">
+            <a:extLst>
+              <a:ext uri="{FF2B5EF4-FFF2-40B4-BE49-F238E27FC236}">
+                <a16:creationId xmlns:a16="http://schemas.microsoft.com/office/drawing/2014/main" id="{B02620E2-2AB9-44CD-A8C7-9D448D8C058D}"/>
+              </a:ext>
+            </a:extLst>
+          </p:cNvPr>
+          <p:cNvCxnSpPr>
+            <a:cxnSpLocks/>
+            <a:endCxn id="86" idx="0"/>
+          </p:cNvCxnSpPr>
+          <p:nvPr/>
+        </p:nvCxnSpPr>
+        <p:spPr>
+          <a:xfrm rot="5400000" flipH="1" flipV="1">
+            <a:off x="8830805" y="1529500"/>
+            <a:ext cx="695502" cy="552841"/>
+          </a:xfrm>
+          <a:prstGeom prst="bentConnector2">
+            <a:avLst/>
+          </a:prstGeom>
+          <a:ln>
+            <a:tailEnd type="triangle"/>
+          </a:ln>
+        </p:spPr>
+        <p:style>
+          <a:lnRef idx="1">
+            <a:schemeClr val="accent1"/>
+          </a:lnRef>
+          <a:fillRef idx="0">
+            <a:schemeClr val="accent1"/>
+          </a:fillRef>
+          <a:effectRef idx="0">
+            <a:schemeClr val="accent1"/>
+          </a:effectRef>
+          <a:fontRef idx="minor">
+            <a:schemeClr val="tx1"/>
+          </a:fontRef>
+        </p:style>
+      </p:cxnSp>
+      <p:pic>
+        <p:nvPicPr>
+          <p:cNvPr id="99" name="Picture 98">
+            <a:extLst>
+              <a:ext uri="{FF2B5EF4-FFF2-40B4-BE49-F238E27FC236}">
+                <a16:creationId xmlns:a16="http://schemas.microsoft.com/office/drawing/2014/main" id="{2391A946-ED78-4282-BE0D-DFD690F4C913}"/>
+              </a:ext>
+            </a:extLst>
+          </p:cNvPr>
+          <p:cNvPicPr>
+            <a:picLocks noChangeAspect="1"/>
+          </p:cNvPicPr>
+          <p:nvPr/>
+        </p:nvPicPr>
+        <p:blipFill>
+          <a:blip r:embed="rId2">
+            <a:extLst>
+              <a:ext uri="{28A0092B-C50C-407E-A947-70E740481C1C}">
+                <a14:useLocalDpi xmlns:a14="http://schemas.microsoft.com/office/drawing/2010/main" val="0"/>
+              </a:ext>
+              <a:ext uri="{837473B0-CC2E-450A-ABE3-18F120FF3D39}">
+                <a1611:picAttrSrcUrl xmlns:a1611="http://schemas.microsoft.com/office/drawing/2016/11/main" r:id="rId3"/>
+              </a:ext>
+            </a:extLst>
+          </a:blip>
+          <a:stretch>
+            <a:fillRect/>
+          </a:stretch>
+        </p:blipFill>
+        <p:spPr>
+          <a:xfrm>
+            <a:off x="1210515" y="4229674"/>
+            <a:ext cx="182880" cy="129967"/>
+          </a:xfrm>
+          <a:prstGeom prst="rect">
+            <a:avLst/>
+          </a:prstGeom>
+        </p:spPr>
+      </p:pic>
+      <p:pic>
+        <p:nvPicPr>
+          <p:cNvPr id="101" name="Graphic 157" descr="Laptop">
+            <a:extLst>
+              <a:ext uri="{FF2B5EF4-FFF2-40B4-BE49-F238E27FC236}">
+                <a16:creationId xmlns:a16="http://schemas.microsoft.com/office/drawing/2014/main" id="{D30BBF55-5DFC-4074-979C-BF4275DE6C31}"/>
+              </a:ext>
+            </a:extLst>
+          </p:cNvPr>
+          <p:cNvPicPr>
+            <a:picLocks noChangeAspect="1" noChangeArrowheads="1"/>
+          </p:cNvPicPr>
+          <p:nvPr/>
+        </p:nvPicPr>
+        <p:blipFill>
+          <a:blip r:embed="rId5">
+            <a:extLst>
+              <a:ext uri="{28A0092B-C50C-407E-A947-70E740481C1C}">
+                <a14:useLocalDpi xmlns:a14="http://schemas.microsoft.com/office/drawing/2010/main" val="0"/>
+              </a:ext>
+            </a:extLst>
+          </a:blip>
+          <a:srcRect/>
+          <a:stretch>
+            <a:fillRect/>
+          </a:stretch>
+        </p:blipFill>
+        <p:spPr bwMode="auto">
+          <a:xfrm>
+            <a:off x="2097742" y="3793557"/>
+            <a:ext cx="457204" cy="457204"/>
+          </a:xfrm>
+          <a:prstGeom prst="rect">
+            <a:avLst/>
+          </a:prstGeom>
+          <a:noFill/>
+          <a:ln>
+            <a:noFill/>
+          </a:ln>
+          <a:extLst>
+            <a:ext uri="{909E8E84-426E-40DD-AFC4-6F175D3DCCD1}">
+              <a14:hiddenFill xmlns:a14="http://schemas.microsoft.com/office/drawing/2010/main">
+                <a:solidFill>
+                  <a:srgbClr val="FFFFFF"/>
+                </a:solidFill>
+              </a14:hiddenFill>
+            </a:ext>
+            <a:ext uri="{91240B29-F687-4F45-9708-019B960494DF}">
+              <a14:hiddenLine xmlns:a14="http://schemas.microsoft.com/office/drawing/2010/main" w="9525">
+                <a:solidFill>
+                  <a:srgbClr val="000000"/>
+                </a:solidFill>
+                <a:miter lim="800000"/>
+                <a:headEnd/>
+                <a:tailEnd/>
+              </a14:hiddenLine>
+            </a:ext>
+          </a:extLst>
+        </p:spPr>
+      </p:pic>
+      <p:cxnSp>
+        <p:nvCxnSpPr>
+          <p:cNvPr id="109" name="Straight Arrow Connector 108">
+            <a:extLst>
+              <a:ext uri="{FF2B5EF4-FFF2-40B4-BE49-F238E27FC236}">
+                <a16:creationId xmlns:a16="http://schemas.microsoft.com/office/drawing/2014/main" id="{62F403D3-F724-421E-96FA-852DB3325CD6}"/>
+              </a:ext>
+            </a:extLst>
+          </p:cNvPr>
+          <p:cNvCxnSpPr>
+            <a:cxnSpLocks/>
+          </p:cNvCxnSpPr>
+          <p:nvPr/>
+        </p:nvCxnSpPr>
+        <p:spPr>
+          <a:xfrm flipH="1">
+            <a:off x="2323154" y="4149080"/>
+            <a:ext cx="3190" cy="521045"/>
+          </a:xfrm>
+          <a:prstGeom prst="straightConnector1">
+            <a:avLst/>
+          </a:prstGeom>
+          <a:ln>
+            <a:tailEnd type="triangle"/>
+          </a:ln>
+        </p:spPr>
+        <p:style>
+          <a:lnRef idx="1">
+            <a:schemeClr val="accent1"/>
+          </a:lnRef>
+          <a:fillRef idx="0">
+            <a:schemeClr val="accent1"/>
+          </a:fillRef>
+          <a:effectRef idx="0">
+            <a:schemeClr val="accent1"/>
+          </a:effectRef>
+          <a:fontRef idx="minor">
+            <a:schemeClr val="tx1"/>
+          </a:fontRef>
+        </p:style>
+      </p:cxnSp>
+      <p:pic>
+        <p:nvPicPr>
+          <p:cNvPr id="111" name="Picture 110">
+            <a:extLst>
+              <a:ext uri="{FF2B5EF4-FFF2-40B4-BE49-F238E27FC236}">
+                <a16:creationId xmlns:a16="http://schemas.microsoft.com/office/drawing/2014/main" id="{05FA4E96-6496-4BD1-A697-E91F7929CBF7}"/>
+              </a:ext>
+            </a:extLst>
+          </p:cNvPr>
+          <p:cNvPicPr>
+            <a:picLocks noChangeAspect="1"/>
+          </p:cNvPicPr>
+          <p:nvPr/>
+        </p:nvPicPr>
+        <p:blipFill>
+          <a:blip r:embed="rId2">
+            <a:extLst>
+              <a:ext uri="{28A0092B-C50C-407E-A947-70E740481C1C}">
+                <a14:useLocalDpi xmlns:a14="http://schemas.microsoft.com/office/drawing/2010/main" val="0"/>
+              </a:ext>
+              <a:ext uri="{837473B0-CC2E-450A-ABE3-18F120FF3D39}">
+                <a1611:picAttrSrcUrl xmlns:a1611="http://schemas.microsoft.com/office/drawing/2016/11/main" r:id="rId3"/>
+              </a:ext>
+            </a:extLst>
+          </a:blip>
+          <a:stretch>
+            <a:fillRect/>
+          </a:stretch>
+        </p:blipFill>
+        <p:spPr>
+          <a:xfrm>
+            <a:off x="2246052" y="4229674"/>
+            <a:ext cx="182880" cy="129967"/>
+          </a:xfrm>
+          <a:prstGeom prst="rect">
+            <a:avLst/>
+          </a:prstGeom>
+        </p:spPr>
+      </p:pic>
+      <p:pic>
+        <p:nvPicPr>
+          <p:cNvPr id="19" name="Picture 18">
+            <a:extLst>
+              <a:ext uri="{FF2B5EF4-FFF2-40B4-BE49-F238E27FC236}">
+                <a16:creationId xmlns:a16="http://schemas.microsoft.com/office/drawing/2014/main" id="{68A21AB8-A383-4A8D-ACAD-F7ECDA52FF39}"/>
+              </a:ext>
+            </a:extLst>
+          </p:cNvPr>
+          <p:cNvPicPr>
+            <a:picLocks noChangeAspect="1"/>
+          </p:cNvPicPr>
+          <p:nvPr/>
+        </p:nvPicPr>
+        <p:blipFill>
+          <a:blip r:embed="rId6">
+            <a:extLst>
+              <a:ext uri="{28A0092B-C50C-407E-A947-70E740481C1C}">
+                <a14:useLocalDpi xmlns:a14="http://schemas.microsoft.com/office/drawing/2010/main" val="0"/>
+              </a:ext>
+              <a:ext uri="{837473B0-CC2E-450A-ABE3-18F120FF3D39}">
+                <a1611:picAttrSrcUrl xmlns:a1611="http://schemas.microsoft.com/office/drawing/2016/11/main" r:id="rId7"/>
+              </a:ext>
+            </a:extLst>
+          </a:blip>
+          <a:stretch>
+            <a:fillRect/>
+          </a:stretch>
+        </p:blipFill>
+        <p:spPr>
+          <a:xfrm>
+            <a:off x="8930042" y="4295906"/>
+            <a:ext cx="584468" cy="294060"/>
+          </a:xfrm>
+          <a:prstGeom prst="rect">
+            <a:avLst/>
+          </a:prstGeom>
+        </p:spPr>
+      </p:pic>
+      <p:cxnSp>
+        <p:nvCxnSpPr>
+          <p:cNvPr id="23" name="Straight Arrow Connector 22">
+            <a:extLst>
+              <a:ext uri="{FF2B5EF4-FFF2-40B4-BE49-F238E27FC236}">
+                <a16:creationId xmlns:a16="http://schemas.microsoft.com/office/drawing/2014/main" id="{159EEBA0-A4BA-4FF1-ACC2-2C2858648818}"/>
+              </a:ext>
+            </a:extLst>
+          </p:cNvPr>
+          <p:cNvCxnSpPr>
+            <a:stCxn id="19" idx="0"/>
+            <a:endCxn id="115" idx="2"/>
+          </p:cNvCxnSpPr>
+          <p:nvPr/>
+        </p:nvCxnSpPr>
+        <p:spPr>
+          <a:xfrm flipV="1">
+            <a:off x="9222276" y="3967368"/>
+            <a:ext cx="3463" cy="328538"/>
+          </a:xfrm>
+          <a:prstGeom prst="straightConnector1">
+            <a:avLst/>
+          </a:prstGeom>
+          <a:ln>
+            <a:tailEnd type="triangle"/>
+          </a:ln>
+        </p:spPr>
+        <p:style>
+          <a:lnRef idx="1">
+            <a:schemeClr val="dk1"/>
+          </a:lnRef>
+          <a:fillRef idx="0">
+            <a:schemeClr val="dk1"/>
+          </a:fillRef>
+          <a:effectRef idx="0">
+            <a:schemeClr val="dk1"/>
+          </a:effectRef>
+          <a:fontRef idx="minor">
+            <a:schemeClr val="tx1"/>
+          </a:fontRef>
+        </p:style>
+      </p:cxnSp>
     </p:spTree>
     <p:extLst>
       <p:ext uri="{BB962C8B-B14F-4D97-AF65-F5344CB8AC3E}">

</xml_diff>